<commit_message>
Docs: Se realiza la modificación de la presentación.
</commit_message>
<xml_diff>
--- a/01_Análisis/01_Presentación/Presentacion.pptx
+++ b/01_Análisis/01_Presentación/Presentacion.pptx
@@ -229,7 +229,7 @@
           <a:p>
             <a:fld id="{4E4206E0-8F38-491F-8DD8-9DEF31DAB11E}" type="datetimeFigureOut">
               <a:rPr lang="es-CO" smtClean="0"/>
-              <a:t>9/03/2019</a:t>
+              <a:t>9/06/2019</a:t>
             </a:fld>
             <a:endParaRPr lang="es-CO"/>
           </a:p>
@@ -394,7 +394,7 @@
           <a:p>
             <a:fld id="{E630483C-9275-974F-8650-05EC61CC7E50}" type="datetimeFigureOut">
               <a:rPr lang="es-ES" smtClean="0"/>
-              <a:t>09/03/2019</a:t>
+              <a:t>09/06/2019</a:t>
             </a:fld>
             <a:endParaRPr lang="es-ES"/>
           </a:p>
@@ -2220,37 +2220,20 @@
                 <a:latin typeface="Calibri"/>
                 <a:cs typeface="Calibri"/>
               </a:rPr>
-              <a:t>Juan Carlos Sánchez</a:t>
-            </a:r>
-            <a:r>
-              <a:rPr lang="es-CO" b="1" dirty="0" smtClean="0">
+              <a:t>Juan Carlos Sánchez.</a:t>
+            </a:r>
+          </a:p>
+          <a:p>
+            <a:r>
+              <a:rPr lang="es-CO" b="1" dirty="0">
                 <a:solidFill>
                   <a:srgbClr val="ACC42D"/>
                 </a:solidFill>
                 <a:latin typeface="Calibri"/>
                 <a:cs typeface="Calibri"/>
               </a:rPr>
-              <a:t>.</a:t>
-            </a:r>
-          </a:p>
-          <a:p>
-            <a:r>
-              <a:rPr lang="es-CO" b="1" dirty="0" smtClean="0">
-                <a:solidFill>
-                  <a:srgbClr val="ACC42D"/>
-                </a:solidFill>
-                <a:latin typeface="Calibri"/>
-                <a:cs typeface="Calibri"/>
-              </a:rPr>
               <a:t>John Chávez.</a:t>
             </a:r>
-            <a:endParaRPr lang="es-CO" b="1" dirty="0">
-              <a:solidFill>
-                <a:srgbClr val="ACC42D"/>
-              </a:solidFill>
-              <a:latin typeface="Calibri"/>
-              <a:cs typeface="Calibri"/>
-            </a:endParaRPr>
           </a:p>
         </p:txBody>
       </p:sp>
@@ -2264,13 +2247,6 @@
   <p:clrMapOvr>
     <a:masterClrMapping/>
   </p:clrMapOvr>
-  <p:timing>
-    <p:tnLst>
-      <p:par>
-        <p:cTn id="1" dur="indefinite" restart="never" nodeType="tmRoot"/>
-      </p:par>
-    </p:tnLst>
-  </p:timing>
 </p:sld>
 </file>
 
@@ -2429,25 +2405,7 @@
                 </a:solidFill>
                 <a:cs typeface="Calibri"/>
               </a:rPr>
-              <a:t>Crear una pagina web con tienda </a:t>
-            </a:r>
-            <a:r>
-              <a:rPr lang="es-419" sz="1400" dirty="0" smtClean="0">
-                <a:solidFill>
-                  <a:srgbClr val="5E5C5D"/>
-                </a:solidFill>
-                <a:cs typeface="Calibri"/>
-              </a:rPr>
-              <a:t>virtual, la </a:t>
-            </a:r>
-            <a:r>
-              <a:rPr lang="es-419" sz="1400" dirty="0">
-                <a:solidFill>
-                  <a:srgbClr val="5E5C5D"/>
-                </a:solidFill>
-                <a:cs typeface="Calibri"/>
-              </a:rPr>
-              <a:t>cual cuente con un diseño amigable y se ajuste a las necesidades de las ventas en parques infantiles y biosaludables del mercado.</a:t>
+              <a:t>Crear una pagina web con tienda virtual, la cual cuente con un diseño amigable y se ajuste a las necesidades de las ventas en parques infantiles y biosaludables del mercado.</a:t>
             </a:r>
             <a:endParaRPr lang="es-ES" sz="1400" dirty="0">
               <a:solidFill>
@@ -2681,23 +2639,19 @@
               </a:rPr>
               <a:t>Brindar el aspecto tecnológico y los conocimientos para el desarrollo </a:t>
             </a:r>
-            <a:endParaRPr lang="es-419" sz="1400" dirty="0" smtClean="0">
-              <a:solidFill>
-                <a:srgbClr val="5E5C5D"/>
-              </a:solidFill>
-              <a:cs typeface="Calibri"/>
-            </a:endParaRPr>
-          </a:p>
-          <a:p>
-            <a:r>
-              <a:rPr lang="es-419" sz="1400" dirty="0" smtClean="0">
+          </a:p>
+          <a:p>
+            <a:r>
+              <a:rPr lang="es-419" sz="1400" dirty="0">
                 <a:solidFill>
                   <a:srgbClr val="5E5C5D"/>
                 </a:solidFill>
                 <a:cs typeface="Calibri"/>
               </a:rPr>
-              <a:t>de </a:t>
-            </a:r>
+              <a:t>de un software, que permite a la empresa ser reconocida a nivel nacional </a:t>
+            </a:r>
+          </a:p>
+          <a:p>
             <a:r>
               <a:rPr lang="es-419" sz="1400" dirty="0">
                 <a:solidFill>
@@ -2705,44 +2659,12 @@
                 </a:solidFill>
                 <a:cs typeface="Calibri"/>
               </a:rPr>
-              <a:t>un software, que permite a la empresa ser reconocida a nivel nacional </a:t>
-            </a:r>
-            <a:endParaRPr lang="es-419" sz="1400" dirty="0" smtClean="0">
-              <a:solidFill>
-                <a:srgbClr val="5E5C5D"/>
-              </a:solidFill>
-              <a:cs typeface="Calibri"/>
-            </a:endParaRPr>
-          </a:p>
-          <a:p>
-            <a:r>
-              <a:rPr lang="es-419" sz="1400" dirty="0" smtClean="0">
-                <a:solidFill>
-                  <a:srgbClr val="5E5C5D"/>
-                </a:solidFill>
-                <a:cs typeface="Calibri"/>
-              </a:rPr>
-              <a:t>por </a:t>
-            </a:r>
+              <a:t>por su obra labor desempeñada en la industria metalúrgica en parques </a:t>
+            </a:r>
+          </a:p>
+          <a:p>
             <a:r>
               <a:rPr lang="es-419" sz="1400" dirty="0">
-                <a:solidFill>
-                  <a:srgbClr val="5E5C5D"/>
-                </a:solidFill>
-                <a:cs typeface="Calibri"/>
-              </a:rPr>
-              <a:t>su obra labor desempeñada en la industria metalúrgica en parques </a:t>
-            </a:r>
-            <a:endParaRPr lang="es-419" sz="1400" dirty="0" smtClean="0">
-              <a:solidFill>
-                <a:srgbClr val="5E5C5D"/>
-              </a:solidFill>
-              <a:cs typeface="Calibri"/>
-            </a:endParaRPr>
-          </a:p>
-          <a:p>
-            <a:r>
-              <a:rPr lang="es-419" sz="1400" dirty="0" smtClean="0">
                 <a:solidFill>
                   <a:srgbClr val="5E5C5D"/>
                 </a:solidFill>
@@ -2757,22 +2679,13 @@
               <a:buChar char="•"/>
             </a:pPr>
             <a:r>
-              <a:rPr lang="es-419" sz="1400" dirty="0" smtClean="0">
+              <a:rPr lang="es-419" sz="1400" dirty="0">
                 <a:solidFill>
                   <a:srgbClr val="5E5C5D"/>
                 </a:solidFill>
                 <a:cs typeface="Calibri"/>
               </a:rPr>
-              <a:t>Dar </a:t>
-            </a:r>
-            <a:r>
-              <a:rPr lang="es-419" sz="1400" dirty="0">
-                <a:solidFill>
-                  <a:srgbClr val="5E5C5D"/>
-                </a:solidFill>
-                <a:cs typeface="Calibri"/>
-              </a:rPr>
-              <a:t>a conocer la misión y visión de la empresa.</a:t>
+              <a:t>Dar a conocer la misión y visión de la empresa.</a:t>
             </a:r>
           </a:p>
           <a:p>
@@ -2918,13 +2831,6 @@
   <p:clrMapOvr>
     <a:masterClrMapping/>
   </p:clrMapOvr>
-  <p:timing>
-    <p:tnLst>
-      <p:par>
-        <p:cTn id="1" dur="indefinite" restart="never" nodeType="tmRoot"/>
-      </p:par>
-    </p:tnLst>
-  </p:timing>
 </p:sld>
 </file>
 
@@ -3315,7 +3221,18 @@
                 </a:solidFill>
                 <a:cs typeface="Calibri"/>
               </a:rPr>
-              <a:t>biosaludables y demás productos fabricados por Diverpark.</a:t>
+              <a:t>biosaludables fabricados por Diverpark y los servicios que ellos ofrecen </a:t>
+            </a:r>
+          </a:p>
+          <a:p>
+            <a:r>
+              <a:rPr lang="es-EC" sz="1400" dirty="0">
+                <a:solidFill>
+                  <a:srgbClr val="5E5C5D"/>
+                </a:solidFill>
+                <a:cs typeface="Calibri"/>
+              </a:rPr>
+              <a:t>como lo son la instalación y mantenimiento de los productos.</a:t>
             </a:r>
             <a:endParaRPr lang="es-419" sz="1400" dirty="0">
               <a:solidFill>
@@ -3336,13 +3253,6 @@
   <p:clrMapOvr>
     <a:masterClrMapping/>
   </p:clrMapOvr>
-  <p:timing>
-    <p:tnLst>
-      <p:par>
-        <p:cTn id="1" dur="indefinite" restart="never" nodeType="tmRoot"/>
-      </p:par>
-    </p:tnLst>
-  </p:timing>
 </p:sld>
 </file>
 
@@ -3786,7 +3696,7 @@
                 </a:solidFill>
                 <a:cs typeface="Calibri"/>
               </a:rPr>
-              <a:t>Permitir la compra de productos a través de la página.</a:t>
+              <a:t>Permitir la compra de productos y servicios a través de la página.</a:t>
             </a:r>
           </a:p>
           <a:p>
@@ -3842,13 +3752,6 @@
   <p:clrMapOvr>
     <a:masterClrMapping/>
   </p:clrMapOvr>
-  <p:timing>
-    <p:tnLst>
-      <p:par>
-        <p:cTn id="1" dur="indefinite" restart="never" nodeType="tmRoot"/>
-      </p:par>
-    </p:tnLst>
-  </p:timing>
 </p:sld>
 </file>
 

</xml_diff>